<commit_message>
Poster (two formats) for Engineering Design Showcase
</commit_message>
<xml_diff>
--- a/SrProject/SmartCamera_Poster2.pptx
+++ b/SrProject/SmartCamera_Poster2.pptx
@@ -1531,6 +1531,31 @@
           </a:bodyPr>
           <a:lstStyle/>
           <a:p>
+            <a:pPr marL="0" marR="0" lvl="0" indent="0" algn="l" defTabSz="914400" rtl="0" eaLnBrk="1" fontAlgn="auto" latinLnBrk="0" hangingPunct="1">
+              <a:lnSpc>
+                <a:spcPct val="100000"/>
+              </a:lnSpc>
+              <a:spcBef>
+                <a:spcPts val="0"/>
+              </a:spcBef>
+              <a:spcAft>
+                <a:spcPts val="0"/>
+              </a:spcAft>
+              <a:buClr>
+                <a:srgbClr val="000000"/>
+              </a:buClr>
+              <a:buSzPts val="1400"/>
+              <a:buFont typeface="Arial"/>
+              <a:buNone/>
+              <a:tabLst/>
+              <a:defRPr/>
+            </a:pPr>
+            <a:r>
+              <a:rPr lang="en-US" sz="4000" dirty="0"/>
+              <a:t>as many of the actions defined as normal took multiple frames to complete, some frames within the behavior appeared to be normal – such as the movement between falling and standing up again.  </a:t>
+            </a:r>
+          </a:p>
+          <a:p>
             <a:pPr marL="0" marR="0" lvl="0" indent="0" algn="l" rtl="0">
               <a:spcBef>
                 <a:spcPts val="0"/>
@@ -1540,7 +1565,7 @@
               </a:spcAft>
               <a:buNone/>
             </a:pPr>
-            <a:endParaRPr sz="4000" b="0" i="0" u="none" strike="noStrike" cap="none">
+            <a:endParaRPr sz="4000" b="0" i="0" u="none" strike="noStrike" cap="none" dirty="0">
               <a:solidFill>
                 <a:schemeClr val="dk1"/>
               </a:solidFill>
@@ -16121,7 +16146,7 @@
         <p:spPr>
           <a:xfrm>
             <a:off x="863600" y="3929600"/>
-            <a:ext cx="9323100" cy="7095900"/>
+            <a:ext cx="9323100" cy="7132100"/>
           </a:xfrm>
           <a:prstGeom prst="rect">
             <a:avLst/>
@@ -16219,7 +16244,7 @@
         </p:blipFill>
         <p:spPr>
           <a:xfrm>
-            <a:off x="6429858" y="4127757"/>
+            <a:off x="6429858" y="4573231"/>
             <a:ext cx="3727839" cy="3364007"/>
           </a:xfrm>
           <a:prstGeom prst="rect">
@@ -16241,8 +16266,8 @@
         </p:nvSpPr>
         <p:spPr>
           <a:xfrm>
-            <a:off x="990478" y="4478416"/>
-            <a:ext cx="5588235" cy="6740307"/>
+            <a:off x="990478" y="4580016"/>
+            <a:ext cx="5588235" cy="6433171"/>
           </a:xfrm>
           <a:prstGeom prst="rect">
             <a:avLst/>
@@ -16266,16 +16291,21 @@
             </a:pPr>
             <a:r>
               <a:rPr lang="en-US" sz="2000" dirty="0"/>
-              <a:t>This project employs a Microsoft® Kinect camera to become a smart security system which can intercept physical assaults. This system stops such crimes with an alert sent to the appropriate response team, based on decisions regarding whether the observed situation is “normal” or “suspicious.” The system will make this decision through a machine-learning program in MATLAB, with the support of specific machine learning toolboxes included within the development environment. This security system will allay concerns about rights to privacy and anonymity within public spaces by guarding the imaging output of the Kinect. This system has the potential be deployed in train stations and even bathrooms to intercept and diminish the threats of mugging and sexual assault, among other applications.</a:t>
+              <a:t>This project employs a Microsoft® Kinect camera to become a smart security system which can intercept physical assaults. This system stops such crimes with an alert sent to the appropriate response team, based on decisions regarding whether the observed situation is “normal” or “suspicious.” As machine learning is a state-of-the-art technology for identifying human behavior, this system will decide whether to alert based on a machine-learning program in MATLAB.</a:t>
+            </a:r>
+            <a:r>
+              <a:rPr lang="en-US" sz="2000" baseline="30000" dirty="0"/>
+              <a:t>1,2</a:t>
+            </a:r>
+            <a:r>
+              <a:rPr lang="en-US" sz="2000" dirty="0"/>
+              <a:t> Also, the security of the system will allay concerns about rights to privacy and anonymity within public spaces by guarding the imaging output of the Kinect. The system has the potential be deployed in train stations and even bathrooms to intercept and diminish the threats of mugging and sexual assault, among other applications.</a:t>
             </a:r>
             <a:endParaRPr lang="en-US" sz="2000" dirty="0">
               <a:solidFill>
                 <a:srgbClr val="FF0000"/>
               </a:solidFill>
             </a:endParaRPr>
-          </a:p>
-          <a:p>
-            <a:endParaRPr lang="en-US" sz="1800" dirty="0"/>
           </a:p>
         </p:txBody>
       </p:sp>
@@ -16293,16 +16323,15 @@
           </p:cNvPicPr>
           <p:nvPr/>
         </p:nvPicPr>
-        <p:blipFill>
+        <p:blipFill rotWithShape="1">
           <a:blip r:embed="rId4"/>
-          <a:stretch>
-            <a:fillRect/>
-          </a:stretch>
+          <a:srcRect b="29679"/>
+          <a:stretch/>
         </p:blipFill>
         <p:spPr>
           <a:xfrm>
-            <a:off x="6630580" y="7766883"/>
-            <a:ext cx="3273533" cy="3177509"/>
+            <a:off x="6578713" y="8481990"/>
+            <a:ext cx="3273533" cy="2234451"/>
           </a:xfrm>
           <a:prstGeom prst="rect">
             <a:avLst/>
@@ -16371,8 +16400,8 @@
         </p:nvSpPr>
         <p:spPr>
           <a:xfrm>
-            <a:off x="10844025" y="3929599"/>
-            <a:ext cx="9324300" cy="8347286"/>
+            <a:off x="10844025" y="3929598"/>
+            <a:ext cx="9324300" cy="8364001"/>
           </a:xfrm>
           <a:prstGeom prst="rect">
             <a:avLst/>
@@ -16438,7 +16467,7 @@
                   <a:schemeClr val="dk1"/>
                 </a:solidFill>
               </a:rPr>
-              <a:t>Define normal behaviors to be detected. Detect each behavior individually, then compile the behaviors into an understanding whether the situation is normal or abnormal.</a:t>
+              <a:t>The process of predicting behaviors begins with defining normal behaviors to be detected. Each behavior is detected individually, then all behaviors are compiled into an understanding whether the situation is normal or abnormal, as illustrated in Figure 3.</a:t>
             </a:r>
             <a:endParaRPr sz="2000" dirty="0">
               <a:solidFill>
@@ -16827,8 +16856,8 @@
         </p:nvSpPr>
         <p:spPr>
           <a:xfrm>
-            <a:off x="838200" y="11298775"/>
-            <a:ext cx="9323100" cy="9884700"/>
+            <a:off x="838200" y="11412359"/>
+            <a:ext cx="9323100" cy="9771115"/>
           </a:xfrm>
           <a:prstGeom prst="rect">
             <a:avLst/>
@@ -16945,7 +16974,7 @@
                   <a:schemeClr val="dk1"/>
                 </a:solidFill>
               </a:rPr>
-              <a:t>The system will assess whether the situation it sees is “normal” or whether the circumstance is an anomaly requiring human intervention.</a:t>
+              <a:t>The system will assess whether the situation it sees is ‘normal’ or whether the circumstance is an anomaly requiring human intervention.</a:t>
             </a:r>
             <a:endParaRPr sz="2000" dirty="0">
               <a:solidFill>
@@ -17149,7 +17178,7 @@
               </a:spcAft>
               <a:buNone/>
             </a:pPr>
-            <a:endParaRPr sz="2000" dirty="0">
+            <a:endParaRPr sz="1800" dirty="0">
               <a:solidFill>
                 <a:srgbClr val="3C78D8"/>
               </a:solidFill>
@@ -17207,53 +17236,8 @@
                   <a:schemeClr val="dk1"/>
                 </a:solidFill>
               </a:rPr>
-              <a:t>Microsoft Kinect will use depth sensor to detect people. This avoids images that might invade the individual’s right to privacy. The Kinect passes the information on how people are moving in the space to MATLAB, which uses machine learning to interpret the people’s behavior. MATLAB decides whether the observed behavior is normal or suspicious, then alerts the appropriate personnel. The five behaviors which the system will recognize are walking, standing, waving, walking in groups, and standing in groups. These behaviors will then be classified into ‘normal’ and ‘abnormal’ categories by a Hidden Markov Model.</a:t>
+              <a:t>The Microsoft Kinect uses a depth sensor to detect the skeletons of people in a space, thus avoiding images that might invade the individual’s right to privacy. The Kinect passes the information about how people are moving to MATLAB, which uses a classifying machine learning program to interpret people’s behavior. MATLAB then decides whether the observed behavior is normal or suspicious, then alerts the appropriate personnel. The five behaviors which the system will recognize are walking, standing, waving, walking in groups, and standing in groups. These behaviors will then be classified into ‘normal’ and ‘abnormal’ categories by a Hidden Markov Model.</a:t>
             </a:r>
-            <a:endParaRPr sz="2000" dirty="0">
-              <a:solidFill>
-                <a:schemeClr val="dk1"/>
-              </a:solidFill>
-            </a:endParaRPr>
-          </a:p>
-          <a:p>
-            <a:pPr marL="0" lvl="0" indent="0" rtl="0">
-              <a:lnSpc>
-                <a:spcPct val="115000"/>
-              </a:lnSpc>
-              <a:spcBef>
-                <a:spcPts val="0"/>
-              </a:spcBef>
-              <a:spcAft>
-                <a:spcPts val="0"/>
-              </a:spcAft>
-              <a:buClr>
-                <a:schemeClr val="dk1"/>
-              </a:buClr>
-              <a:buSzPts val="1100"/>
-              <a:buFont typeface="Arial"/>
-              <a:buNone/>
-            </a:pPr>
-            <a:endParaRPr sz="1800" dirty="0">
-              <a:solidFill>
-                <a:schemeClr val="dk1"/>
-              </a:solidFill>
-            </a:endParaRPr>
-          </a:p>
-          <a:p>
-            <a:pPr marL="0" lvl="0" indent="0" rtl="0">
-              <a:spcBef>
-                <a:spcPts val="0"/>
-              </a:spcBef>
-              <a:spcAft>
-                <a:spcPts val="0"/>
-              </a:spcAft>
-              <a:buClr>
-                <a:schemeClr val="dk1"/>
-              </a:buClr>
-              <a:buSzPts val="1100"/>
-              <a:buFont typeface="Arial"/>
-              <a:buNone/>
-            </a:pPr>
             <a:endParaRPr sz="2000" dirty="0">
               <a:solidFill>
                 <a:schemeClr val="dk1"/>
@@ -17291,8 +17275,8 @@
         </p:nvSpPr>
         <p:spPr>
           <a:xfrm>
-            <a:off x="20818650" y="19009125"/>
-            <a:ext cx="9355500" cy="1318200"/>
+            <a:off x="20811450" y="18615645"/>
+            <a:ext cx="9362700" cy="1263221"/>
           </a:xfrm>
           <a:prstGeom prst="rect">
             <a:avLst/>
@@ -17318,30 +17302,131 @@
           <a:p>
             <a:pPr marL="0" marR="0" lvl="0" indent="0" algn="l" rtl="0">
               <a:spcBef>
-                <a:spcPts val="1000"/>
-              </a:spcBef>
-              <a:spcAft>
-                <a:spcPts val="1000"/>
+                <a:spcPts val="200"/>
+              </a:spcBef>
+              <a:spcAft>
+                <a:spcPts val="200"/>
               </a:spcAft>
               <a:buNone/>
             </a:pPr>
             <a:r>
-              <a:rPr lang="en-US" sz="2400" b="1" dirty="0">
+              <a:rPr lang="en-US" sz="2000" b="1" dirty="0">
                 <a:solidFill>
                   <a:srgbClr val="1C4587"/>
                 </a:solidFill>
               </a:rPr>
               <a:t>References</a:t>
             </a:r>
-            <a:endParaRPr sz="2400" b="1" dirty="0">
+          </a:p>
+          <a:p>
+            <a:pPr marL="228600" lvl="0" indent="-228600">
+              <a:buSzPts val="1100"/>
+              <a:buAutoNum type="arabicPeriod"/>
+            </a:pPr>
+            <a:r>
+              <a:rPr lang="en-US" sz="1000" dirty="0" err="1"/>
+              <a:t>Jie</a:t>
+            </a:r>
+            <a:r>
+              <a:rPr lang="en-US" sz="1000" dirty="0"/>
+              <a:t> Yang, </a:t>
+            </a:r>
+            <a:r>
+              <a:rPr lang="en-US" sz="1000" dirty="0" err="1"/>
+              <a:t>Yangsheng</a:t>
+            </a:r>
+            <a:r>
+              <a:rPr lang="en-US" sz="1000" dirty="0"/>
+              <a:t> Xu and C. S. Chen, "Human action learning via hidden Markov model," in </a:t>
+            </a:r>
+            <a:r>
+              <a:rPr lang="en-US" sz="1000" i="1" dirty="0"/>
+              <a:t>IEEE Transactions on Systems, Man, and Cybernetics - Part A: Systems and Humans</a:t>
+            </a:r>
+            <a:r>
+              <a:rPr lang="en-US" sz="1000" dirty="0"/>
+              <a:t>, vol. 27, no. 1, pp. 34-44, Jan 1997.</a:t>
+            </a:r>
+          </a:p>
+          <a:p>
+            <a:pPr marL="228600" indent="-228600">
+              <a:buSzPts val="1100"/>
+              <a:buFont typeface="Arial"/>
+              <a:buAutoNum type="arabicPeriod"/>
+            </a:pPr>
+            <a:r>
+              <a:rPr lang="en-US" sz="1000" dirty="0"/>
+              <a:t>P. </a:t>
+            </a:r>
+            <a:r>
+              <a:rPr lang="en-US" sz="1000" dirty="0" err="1"/>
+              <a:t>Turaga</a:t>
+            </a:r>
+            <a:r>
+              <a:rPr lang="en-US" sz="1000" dirty="0"/>
+              <a:t>, R. </a:t>
+            </a:r>
+            <a:r>
+              <a:rPr lang="en-US" sz="1000" dirty="0" err="1"/>
+              <a:t>Chellappa</a:t>
+            </a:r>
+            <a:r>
+              <a:rPr lang="en-US" sz="1000" dirty="0"/>
+              <a:t>, V. S. </a:t>
+            </a:r>
+            <a:r>
+              <a:rPr lang="en-US" sz="1000" dirty="0" err="1"/>
+              <a:t>Subrahmanian</a:t>
+            </a:r>
+            <a:r>
+              <a:rPr lang="en-US" sz="1000" dirty="0"/>
+              <a:t> and O. </a:t>
+            </a:r>
+            <a:r>
+              <a:rPr lang="en-US" sz="1000" dirty="0" err="1"/>
+              <a:t>Udrea</a:t>
+            </a:r>
+            <a:r>
+              <a:rPr lang="en-US" sz="1000" dirty="0"/>
+              <a:t>, "Machine Recognition of Human Activities: A Survey," in IEEE Transactions on Circuits and Systems for Video Technology, vol. 18, no. 11, pp. 1473-1488, Nov. 2008.</a:t>
+            </a:r>
+          </a:p>
+          <a:p>
+            <a:pPr marL="228600" indent="-228600">
+              <a:buSzPts val="1100"/>
+              <a:buFont typeface="Arial"/>
+              <a:buAutoNum type="arabicPeriod"/>
+            </a:pPr>
+            <a:r>
+              <a:rPr lang="en-US" sz="1000" dirty="0"/>
+              <a:t>X. Zhu and Z. Liu, “Behavior Clustering for Anomaly Detection,” </a:t>
+            </a:r>
+            <a:r>
+              <a:rPr lang="en-US" sz="1000" i="1" dirty="0"/>
+              <a:t>Frontiers of Computer Science in China</a:t>
+            </a:r>
+            <a:r>
+              <a:rPr lang="en-US" sz="1000" dirty="0"/>
+              <a:t>, pp. 141–27, 2011.</a:t>
+            </a:r>
+            <a:endParaRPr lang="en-US" sz="2000" b="1" dirty="0">
               <a:solidFill>
                 <a:srgbClr val="1C4587"/>
               </a:solidFill>
-              <a:latin typeface="Arial"/>
-              <a:ea typeface="Arial"/>
-              <a:cs typeface="Arial"/>
-              <a:sym typeface="Arial"/>
             </a:endParaRPr>
+          </a:p>
+          <a:p>
+            <a:pPr>
+              <a:buSzPts val="1100"/>
+            </a:pPr>
+            <a:endParaRPr lang="en-US" sz="1000" dirty="0"/>
+          </a:p>
+          <a:p>
+            <a:pPr marL="228600" lvl="0" indent="-228600">
+              <a:buSzPts val="1100"/>
+              <a:buAutoNum type="arabicPeriod"/>
+            </a:pPr>
+            <a:endParaRPr lang="en-US" sz="1000" dirty="0"/>
           </a:p>
         </p:txBody>
       </p:sp>
@@ -17563,8 +17648,8 @@
         </p:nvSpPr>
         <p:spPr>
           <a:xfrm>
-            <a:off x="20811450" y="20417375"/>
-            <a:ext cx="9355500" cy="730500"/>
+            <a:off x="20811450" y="20771893"/>
+            <a:ext cx="9362700" cy="375982"/>
           </a:xfrm>
           <a:prstGeom prst="rect">
             <a:avLst/>
@@ -17589,9 +17674,6 @@
           <a:lstStyle/>
           <a:p>
             <a:pPr marL="0" marR="0" lvl="0" indent="0" algn="l" rtl="0">
-              <a:spcBef>
-                <a:spcPts val="1000"/>
-              </a:spcBef>
               <a:spcAft>
                 <a:spcPts val="0"/>
               </a:spcAft>
@@ -17623,60 +17705,12 @@
                   <a:srgbClr val="1C4587"/>
                 </a:solidFill>
               </a:rPr>
-              <a:t>, </a:t>
+              <a:t>, aballerina22gmail.com</a:t>
             </a:r>
-            <a:r>
-              <a:rPr lang="en-US" sz="2000" b="1" dirty="0" err="1">
-                <a:solidFill>
-                  <a:srgbClr val="1C4587"/>
-                </a:solidFill>
-              </a:rPr>
-              <a:t>amyEmail</a:t>
-            </a:r>
-            <a:endParaRPr sz="2000" b="1" dirty="0">
-              <a:solidFill>
-                <a:srgbClr val="1C4587"/>
-              </a:solidFill>
-              <a:latin typeface="Arial"/>
-              <a:ea typeface="Arial"/>
-              <a:cs typeface="Arial"/>
-              <a:sym typeface="Arial"/>
-            </a:endParaRPr>
-          </a:p>
-          <a:p>
-            <a:pPr marL="0" marR="0" lvl="0" indent="0" algn="l" rtl="0">
-              <a:spcBef>
-                <a:spcPts val="0"/>
-              </a:spcBef>
-              <a:spcAft>
-                <a:spcPts val="0"/>
-              </a:spcAft>
-              <a:buNone/>
-            </a:pPr>
             <a:endParaRPr sz="2500" b="1" dirty="0">
               <a:solidFill>
                 <a:srgbClr val="3C78D8"/>
               </a:solidFill>
-            </a:endParaRPr>
-          </a:p>
-          <a:p>
-            <a:pPr marL="0" marR="0" lvl="0" indent="0" algn="l" rtl="0">
-              <a:spcBef>
-                <a:spcPts val="1350"/>
-              </a:spcBef>
-              <a:spcAft>
-                <a:spcPts val="0"/>
-              </a:spcAft>
-              <a:buNone/>
-            </a:pPr>
-            <a:endParaRPr sz="2500" dirty="0">
-              <a:solidFill>
-                <a:srgbClr val="A50021"/>
-              </a:solidFill>
-              <a:latin typeface="Arial"/>
-              <a:ea typeface="Arial"/>
-              <a:cs typeface="Arial"/>
-              <a:sym typeface="Arial"/>
             </a:endParaRPr>
           </a:p>
         </p:txBody>
@@ -17716,19 +17750,15 @@
               <a:buNone/>
             </a:pPr>
             <a:r>
-              <a:rPr lang="en-US" sz="3100" baseline="30000">
+              <a:rPr lang="en-US" sz="3100" baseline="30000" dirty="0">
                 <a:solidFill>
                   <a:srgbClr val="7F7F7F"/>
                 </a:solidFill>
-                <a:latin typeface="Arial"/>
-                <a:ea typeface="Arial"/>
-                <a:cs typeface="Arial"/>
-                <a:sym typeface="Arial"/>
               </a:rPr>
-              <a:t>1</a:t>
+              <a:t> </a:t>
             </a:r>
             <a:r>
-              <a:rPr lang="en-US" sz="3100">
+              <a:rPr lang="en-US" sz="3100" dirty="0">
                 <a:solidFill>
                   <a:srgbClr val="7F7F7F"/>
                 </a:solidFill>
@@ -17740,71 +17770,16 @@
               <a:t>Loyola Marymount University, Department of </a:t>
             </a:r>
             <a:r>
-              <a:rPr lang="en-US" sz="3100">
+              <a:rPr lang="en-US" sz="3100" dirty="0">
                 <a:solidFill>
                   <a:srgbClr val="7F7F7F"/>
                 </a:solidFill>
               </a:rPr>
               <a:t>Electrical Engineering and Computer Science</a:t>
             </a:r>
-            <a:endParaRPr sz="3100">
+            <a:endParaRPr sz="3100" dirty="0">
               <a:solidFill>
                 <a:srgbClr val="7F7F7F"/>
-              </a:solidFill>
-              <a:latin typeface="Arial"/>
-              <a:ea typeface="Arial"/>
-              <a:cs typeface="Arial"/>
-              <a:sym typeface="Arial"/>
-            </a:endParaRPr>
-          </a:p>
-        </p:txBody>
-      </p:sp>
-      <p:sp>
-        <p:nvSpPr>
-          <p:cNvPr id="102" name="Shape 102"/>
-          <p:cNvSpPr txBox="1"/>
-          <p:nvPr/>
-        </p:nvSpPr>
-        <p:spPr>
-          <a:xfrm>
-            <a:off x="20970550" y="19596825"/>
-            <a:ext cx="9092400" cy="731520"/>
-          </a:xfrm>
-          <a:prstGeom prst="rect">
-            <a:avLst/>
-          </a:prstGeom>
-          <a:noFill/>
-          <a:ln>
-            <a:noFill/>
-          </a:ln>
-        </p:spPr>
-        <p:txBody>
-          <a:bodyPr spcFirstLastPara="1" wrap="square" lIns="91425" tIns="45700" rIns="91425" bIns="45700" anchor="t" anchorCtr="0">
-            <a:noAutofit/>
-          </a:bodyPr>
-          <a:lstStyle/>
-          <a:p>
-            <a:pPr>
-              <a:buClr>
-                <a:schemeClr val="dk1"/>
-              </a:buClr>
-              <a:buSzPts val="1100"/>
-            </a:pPr>
-            <a:r>
-              <a:rPr lang="en-US" dirty="0"/>
-              <a:t>X. Zhu and Z. Liu, “Behavior Clustering for Anomaly Detection,” </a:t>
-            </a:r>
-            <a:r>
-              <a:rPr lang="en-US" i="1" dirty="0"/>
-              <a:t>Frontiers of Computer Science in China</a:t>
-            </a:r>
-            <a:r>
-              <a:rPr lang="en-US" dirty="0"/>
-              <a:t>, pp. 14–27, 2011.</a:t>
-            </a:r>
-            <a:endParaRPr sz="1100" dirty="0">
-              <a:solidFill>
-                <a:schemeClr val="dk1"/>
               </a:solidFill>
               <a:latin typeface="Arial"/>
               <a:ea typeface="Arial"/>
@@ -17922,7 +17897,7 @@
             </a:pPr>
             <a:r>
               <a:rPr lang="en-US" sz="1200" b="1" dirty="0"/>
-              <a:t>Figure 1: Outline of process used to classify behaviors in real-time</a:t>
+              <a:t>Figure 3: Outline of process used to classify behaviors in real-time</a:t>
             </a:r>
             <a:endParaRPr b="1" dirty="0"/>
           </a:p>
@@ -17936,10 +17911,10 @@
         </p:nvGrpSpPr>
         <p:grpSpPr>
           <a:xfrm>
-            <a:off x="20825650" y="3928123"/>
-            <a:ext cx="9445500" cy="10966211"/>
-            <a:chOff x="10844025" y="12410399"/>
-            <a:chExt cx="9445500" cy="8253345"/>
+            <a:off x="20811450" y="3890026"/>
+            <a:ext cx="9338500" cy="11004311"/>
+            <a:chOff x="10829825" y="12381725"/>
+            <a:chExt cx="9338500" cy="8282019"/>
           </a:xfrm>
         </p:grpSpPr>
         <p:sp>
@@ -17950,8 +17925,8 @@
           </p:nvSpPr>
           <p:spPr>
             <a:xfrm>
-              <a:off x="10844025" y="12411644"/>
-              <a:ext cx="9324300" cy="8252100"/>
+              <a:off x="10829825" y="12411644"/>
+              <a:ext cx="9338500" cy="8252100"/>
             </a:xfrm>
             <a:prstGeom prst="rect">
               <a:avLst/>
@@ -18073,13 +18048,15 @@
           </p:nvSpPr>
           <p:spPr>
             <a:xfrm>
-              <a:off x="16327125" y="15122390"/>
-              <a:ext cx="3962400" cy="497400"/>
+              <a:off x="16736814" y="14668649"/>
+              <a:ext cx="3348500" cy="324491"/>
             </a:xfrm>
             <a:prstGeom prst="rect">
               <a:avLst/>
             </a:prstGeom>
-            <a:noFill/>
+            <a:solidFill>
+              <a:schemeClr val="bg1"/>
+            </a:solidFill>
             <a:ln>
               <a:noFill/>
             </a:ln>
@@ -18105,7 +18082,7 @@
               </a:pPr>
               <a:r>
                 <a:rPr lang="en-US" sz="1200" b="1" dirty="0"/>
-                <a:t>Figure 6: Results of accuracy testing for ‘normal’ vs. ‘abnormal'</a:t>
+                <a:t>Figure 8: Results of accuracy testing for ‘normal’ vs. ‘abnormal'</a:t>
               </a:r>
               <a:endParaRPr b="1" dirty="0"/>
             </a:p>
@@ -18119,7 +18096,7 @@
           </p:nvSpPr>
           <p:spPr>
             <a:xfrm>
-              <a:off x="10965225" y="12410399"/>
+              <a:off x="10965225" y="12381725"/>
               <a:ext cx="5240700" cy="3541446"/>
             </a:xfrm>
             <a:prstGeom prst="rect">
@@ -18137,11 +18114,8 @@
             <a:lstStyle/>
             <a:p>
               <a:pPr marL="0" lvl="0" indent="0" rtl="0">
-                <a:lnSpc>
-                  <a:spcPct val="115000"/>
-                </a:lnSpc>
                 <a:spcBef>
-                  <a:spcPts val="0"/>
+                  <a:spcPts val="1000"/>
                 </a:spcBef>
                 <a:spcAft>
                   <a:spcPts val="0"/>
@@ -18159,7 +18133,7 @@
                     <a:srgbClr val="1C4587"/>
                   </a:solidFill>
                 </a:rPr>
-                <a:t>Accuracy</a:t>
+                <a:t>Accuracy Testing</a:t>
               </a:r>
               <a:endParaRPr sz="2400" b="1" dirty="0">
                 <a:solidFill>
@@ -18191,7 +18165,7 @@
                     <a:schemeClr val="dk1"/>
                   </a:solidFill>
                 </a:rPr>
-                <a:t>To determine the accuracy for the detection of behaviors, the program was run for three trials of 60 seconds, with a person acting out each movement in front of the camera. For example, if a person walked for 30 seconds in front of the camera, the ‘Walk vs. Abnormal’ would be correct to report ‘Walk’ and incorrect to report ‘Abnormal’ during that time. After 60 seconds for each behavior, the labels were sorted ‘normal’ or ‘abnormal’ and as seen in Figure 6.</a:t>
+                <a:t>To determine the accuracy for the detection of behaviors, the program was run for fifteen trials of thirty seconds, with a person acting out each movement in front of the camera. After thirty seconds of each behavior, the labels were sorted into ‘normal’ or ‘abnormal’ as seen in Figure 8.</a:t>
               </a:r>
               <a:endParaRPr dirty="0"/>
             </a:p>
@@ -18206,10 +18180,10 @@
         </p:nvGrpSpPr>
         <p:grpSpPr>
           <a:xfrm>
-            <a:off x="10824225" y="12844320"/>
-            <a:ext cx="9324300" cy="8338388"/>
-            <a:chOff x="20818650" y="7927575"/>
-            <a:chExt cx="9324300" cy="8125500"/>
+            <a:off x="10824225" y="12674600"/>
+            <a:ext cx="9344100" cy="8508108"/>
+            <a:chOff x="20818650" y="7762188"/>
+            <a:chExt cx="9344100" cy="8290887"/>
           </a:xfrm>
         </p:grpSpPr>
         <p:sp>
@@ -18220,8 +18194,8 @@
           </p:nvSpPr>
           <p:spPr>
             <a:xfrm>
-              <a:off x="20818650" y="7927575"/>
-              <a:ext cx="9324300" cy="8125500"/>
+              <a:off x="20818650" y="7762188"/>
+              <a:ext cx="9344100" cy="8290887"/>
             </a:xfrm>
             <a:prstGeom prst="rect">
               <a:avLst/>
@@ -18260,24 +18234,8 @@
                     <a:srgbClr val="1C4587"/>
                   </a:solidFill>
                 </a:rPr>
-                <a:t>Detected Behaviors (Color Pictures)</a:t>
+                <a:t>Detected Behaviors</a:t>
               </a:r>
-              <a:endParaRPr sz="1600" dirty="0">
-                <a:solidFill>
-                  <a:srgbClr val="1C4587"/>
-                </a:solidFill>
-              </a:endParaRPr>
-            </a:p>
-            <a:p>
-              <a:pPr marL="0" marR="0" lvl="0" indent="0" algn="l" rtl="0">
-                <a:spcBef>
-                  <a:spcPts val="1350"/>
-                </a:spcBef>
-                <a:spcAft>
-                  <a:spcPts val="0"/>
-                </a:spcAft>
-                <a:buNone/>
-              </a:pPr>
               <a:endParaRPr sz="1800" dirty="0"/>
             </a:p>
             <a:p>
@@ -18302,10 +18260,10 @@
           </p:nvGrpSpPr>
           <p:grpSpPr>
             <a:xfrm>
-              <a:off x="21057800" y="8733444"/>
-              <a:ext cx="8724651" cy="7178643"/>
-              <a:chOff x="21184800" y="10753357"/>
-              <a:chExt cx="8724651" cy="7178643"/>
+              <a:off x="21057800" y="8662160"/>
+              <a:ext cx="8724651" cy="7249927"/>
+              <a:chOff x="21184800" y="10682073"/>
+              <a:chExt cx="8724651" cy="7249927"/>
             </a:xfrm>
           </p:grpSpPr>
           <p:sp>
@@ -18316,7 +18274,7 @@
             </p:nvSpPr>
             <p:spPr>
               <a:xfrm>
-                <a:off x="25891475" y="13760175"/>
+                <a:off x="25891475" y="13688889"/>
                 <a:ext cx="4017900" cy="540300"/>
               </a:xfrm>
               <a:prstGeom prst="rect">
@@ -18343,10 +18301,10 @@
                   <a:buNone/>
                 </a:pPr>
                 <a:r>
-                  <a:rPr lang="en-US" sz="1200" b="1"/>
-                  <a:t>Figure 3: Wave vs. Abnormal algorithm detecting ‘Wave’ and ‘Stand’</a:t>
+                  <a:rPr lang="en-US" sz="1200" b="1" dirty="0"/>
+                  <a:t>Figure 5: Wave (Normal) vs. Abnormal algorithm detecting ‘Wave’ and ‘Stand’</a:t>
                 </a:r>
-                <a:endParaRPr sz="1200" b="1"/>
+                <a:endParaRPr sz="1200" b="1" dirty="0"/>
               </a:p>
               <a:p>
                 <a:pPr marL="0" lvl="0" indent="0" rtl="0">
@@ -18358,7 +18316,7 @@
                   </a:spcAft>
                   <a:buNone/>
                 </a:pPr>
-                <a:endParaRPr sz="1200" b="1"/>
+                <a:endParaRPr sz="1200" b="1" dirty="0"/>
               </a:p>
             </p:txBody>
           </p:sp>
@@ -18370,7 +18328,7 @@
             </p:nvSpPr>
             <p:spPr>
               <a:xfrm>
-                <a:off x="21184800" y="13794775"/>
+                <a:off x="21184800" y="13723491"/>
                 <a:ext cx="4128600" cy="540300"/>
               </a:xfrm>
               <a:prstGeom prst="rect">
@@ -18397,10 +18355,10 @@
                   <a:buNone/>
                 </a:pPr>
                 <a:r>
-                  <a:rPr lang="en-US" sz="1200" b="1"/>
-                  <a:t>Figure 2: Stand vs. Abnormal algorithm detecting ‘Stand’</a:t>
+                  <a:rPr lang="en-US" sz="1200" b="1" dirty="0"/>
+                  <a:t>Figure 4: Stand (Normal) vs. Abnormal algorithm detecting ‘Stand’</a:t>
                 </a:r>
-                <a:endParaRPr sz="1200" b="1"/>
+                <a:endParaRPr sz="1200" b="1" dirty="0"/>
               </a:p>
               <a:p>
                 <a:pPr marL="0" lvl="0" indent="0" rtl="0">
@@ -18412,7 +18370,7 @@
                   </a:spcAft>
                   <a:buNone/>
                 </a:pPr>
-                <a:endParaRPr sz="1200" b="1"/>
+                <a:endParaRPr sz="1200" b="1" dirty="0"/>
               </a:p>
             </p:txBody>
           </p:sp>
@@ -18424,10 +18382,10 @@
             </p:nvGrpSpPr>
             <p:grpSpPr>
               <a:xfrm>
-                <a:off x="21184800" y="10753357"/>
-                <a:ext cx="8724651" cy="6638342"/>
-                <a:chOff x="21354800" y="4791657"/>
-                <a:chExt cx="8724651" cy="6638342"/>
+                <a:off x="21184800" y="10682073"/>
+                <a:ext cx="8724651" cy="6709626"/>
+                <a:chOff x="21354800" y="4720373"/>
+                <a:chExt cx="8724651" cy="6709626"/>
               </a:xfrm>
             </p:grpSpPr>
             <p:pic>
@@ -18445,7 +18403,7 @@
               </p:blipFill>
               <p:spPr>
                 <a:xfrm>
-                  <a:off x="21354800" y="4791657"/>
+                  <a:off x="21354800" y="4720373"/>
                   <a:ext cx="4164502" cy="3008070"/>
                 </a:xfrm>
                 <a:prstGeom prst="rect">
@@ -18472,7 +18430,7 @@
               </p:blipFill>
               <p:spPr>
                 <a:xfrm>
-                  <a:off x="26025800" y="4797971"/>
+                  <a:off x="26025800" y="4726687"/>
                   <a:ext cx="4053651" cy="2995431"/>
                 </a:xfrm>
                 <a:prstGeom prst="rect">
@@ -18574,10 +18532,10 @@
                   <a:buNone/>
                 </a:pPr>
                 <a:r>
-                  <a:rPr lang="en-US" sz="1200" b="1"/>
-                  <a:t>Figure 4: Walk vs. Abnormal algorithm detecting ‘Walk’</a:t>
+                  <a:rPr lang="en-US" sz="1200" b="1" dirty="0"/>
+                  <a:t>Figure 6: Walk (Normal) vs. Abnormal algorithm detecting ‘Walk’</a:t>
                 </a:r>
-                <a:endParaRPr sz="1200" b="1"/>
+                <a:endParaRPr sz="1200" b="1" dirty="0"/>
               </a:p>
               <a:p>
                 <a:pPr marL="0" lvl="0" indent="0" rtl="0">
@@ -18589,7 +18547,7 @@
                   </a:spcAft>
                   <a:buNone/>
                 </a:pPr>
-                <a:endParaRPr sz="1200" b="1"/>
+                <a:endParaRPr sz="1200" b="1" dirty="0"/>
               </a:p>
             </p:txBody>
           </p:sp>
@@ -18633,14 +18591,14 @@
                   <a:buNone/>
                 </a:pPr>
                 <a:r>
-                  <a:rPr lang="en-US" sz="1200" b="1">
+                  <a:rPr lang="en-US" sz="1200" b="1" dirty="0">
                     <a:solidFill>
                       <a:schemeClr val="dk1"/>
                     </a:solidFill>
                   </a:rPr>
-                  <a:t>Figure 5: Falling appears as ‘Abnormal’ for all algorithms</a:t>
+                  <a:t>Figure 7: Falling appears as ‘Abnormal’ for all algorithms</a:t>
                 </a:r>
-                <a:endParaRPr b="1">
+                <a:endParaRPr b="1" dirty="0">
                   <a:solidFill>
                     <a:schemeClr val="dk1"/>
                   </a:solidFill>
@@ -18656,7 +18614,7 @@
                   </a:spcAft>
                   <a:buNone/>
                 </a:pPr>
-                <a:endParaRPr sz="1200" b="1"/>
+                <a:endParaRPr sz="1200" b="1" dirty="0"/>
               </a:p>
               <a:p>
                 <a:pPr marL="0" lvl="0" indent="0" rtl="0">
@@ -18668,7 +18626,7 @@
                   </a:spcAft>
                   <a:buNone/>
                 </a:pPr>
-                <a:endParaRPr sz="1200" b="1"/>
+                <a:endParaRPr sz="1200" b="1" dirty="0"/>
               </a:p>
             </p:txBody>
           </p:sp>
@@ -18682,8 +18640,8 @@
         </p:nvSpPr>
         <p:spPr>
           <a:xfrm>
-            <a:off x="20825650" y="15441677"/>
-            <a:ext cx="9324300" cy="3296648"/>
+            <a:off x="20811450" y="15268722"/>
+            <a:ext cx="9338500" cy="2960140"/>
           </a:xfrm>
           <a:prstGeom prst="rect">
             <a:avLst/>
@@ -18786,7 +18744,7 @@
                   <a:schemeClr val="dk1"/>
                 </a:solidFill>
               </a:rPr>
-              <a:t>The system has the potential to work better than traditional security cameras, as it can alert personnel to suspicious activity rather than relying on  a human to monitor the images constantly. As it  protects the right to privacy of the individual, this system  could be used where standard security cameras would be too intrusive.</a:t>
+              <a:t>The system has the potential to work better than traditional security cameras, as it can alert personnel to suspicious activity rather than relying on a human to monitor the images constantly, and protects personal information so that it could be used where standard security cameras would be too intrusive.</a:t>
             </a:r>
             <a:endParaRPr sz="1800" dirty="0"/>
           </a:p>
@@ -18821,12 +18779,376 @@
           </a:prstGeom>
         </p:spPr>
       </p:pic>
+      <mc:AlternateContent xmlns:mc="http://schemas.openxmlformats.org/markup-compatibility/2006">
+        <mc:Choice xmlns:a14="http://schemas.microsoft.com/office/drawing/2010/main" Requires="a14">
+          <p:sp>
+            <p:nvSpPr>
+              <p:cNvPr id="7" name="TextBox 6">
+                <a:extLst>
+                  <a:ext uri="{FF2B5EF4-FFF2-40B4-BE49-F238E27FC236}">
+                    <a16:creationId xmlns:a16="http://schemas.microsoft.com/office/drawing/2014/main" id="{50AF90CF-B87C-E04E-AC30-4AE54C3B1BD9}"/>
+                  </a:ext>
+                </a:extLst>
+              </p:cNvPr>
+              <p:cNvSpPr txBox="1"/>
+              <p:nvPr/>
+            </p:nvSpPr>
+            <p:spPr>
+              <a:xfrm>
+                <a:off x="20946850" y="7518621"/>
+                <a:ext cx="9092654" cy="7571047"/>
+              </a:xfrm>
+              <a:prstGeom prst="rect">
+                <a:avLst/>
+              </a:prstGeom>
+              <a:noFill/>
+            </p:spPr>
+            <p:txBody>
+              <a:bodyPr wrap="square" rtlCol="0">
+                <a:spAutoFit/>
+              </a:bodyPr>
+              <a:lstStyle/>
+              <a:p>
+                <a:pPr lvl="0">
+                  <a:spcBef>
+                    <a:spcPts val="1350"/>
+                  </a:spcBef>
+                </a:pPr>
+                <a:r>
+                  <a:rPr lang="en-US" sz="2400" b="1" dirty="0">
+                    <a:solidFill>
+                      <a:srgbClr val="1C4587"/>
+                    </a:solidFill>
+                  </a:rPr>
+                  <a:t>Results and Discussion</a:t>
+                </a:r>
+                <a:endParaRPr lang="en-US" sz="1600" dirty="0">
+                  <a:solidFill>
+                    <a:srgbClr val="1C4587"/>
+                  </a:solidFill>
+                </a:endParaRPr>
+              </a:p>
+              <a:p>
+                <a:pPr lvl="0">
+                  <a:lnSpc>
+                    <a:spcPct val="114000"/>
+                  </a:lnSpc>
+                  <a:spcBef>
+                    <a:spcPts val="1000"/>
+                  </a:spcBef>
+                </a:pPr>
+                <a:r>
+                  <a:rPr lang="en-US" sz="2000" dirty="0"/>
+                  <a:t>After collecting the data in Figure 8, the false alarm detection rates and the anomaly detection rates were determined.</a:t>
+                </a:r>
+                <a:r>
+                  <a:rPr lang="en-US" sz="2000" baseline="30000" dirty="0"/>
+                  <a:t>3</a:t>
+                </a:r>
+                <a:r>
+                  <a:rPr lang="en-US" sz="2000" dirty="0"/>
+                  <a:t> </a:t>
+                </a:r>
+              </a:p>
+              <a:p>
+                <a:pPr algn="r">
+                  <a:lnSpc>
+                    <a:spcPct val="114000"/>
+                  </a:lnSpc>
+                </a:pPr>
+                <a14:m>
+                  <m:oMath xmlns:m="http://schemas.openxmlformats.org/officeDocument/2006/math">
+                    <m:f>
+                      <m:fPr>
+                        <m:ctrlPr>
+                          <a:rPr lang="en-US" sz="2000" i="1">
+                            <a:latin typeface="Cambria Math" panose="02040503050406030204" pitchFamily="18" charset="0"/>
+                          </a:rPr>
+                        </m:ctrlPr>
+                      </m:fPr>
+                      <m:num>
+                        <m:r>
+                          <a:rPr lang="en-US" sz="2000" i="1">
+                            <a:latin typeface="Cambria Math" panose="02040503050406030204" pitchFamily="18" charset="0"/>
+                          </a:rPr>
+                          <m:t>#(</m:t>
+                        </m:r>
+                        <m:r>
+                          <a:rPr lang="en-US" sz="2000" b="0" i="1" smtClean="0">
+                            <a:latin typeface="Cambria Math" panose="02040503050406030204" pitchFamily="18" charset="0"/>
+                          </a:rPr>
+                          <m:t>𝑛𝑜𝑟𝑚𝑎𝑙</m:t>
+                        </m:r>
+                        <m:r>
+                          <a:rPr lang="en-US" sz="2000" i="1">
+                            <a:latin typeface="Cambria Math" panose="02040503050406030204" pitchFamily="18" charset="0"/>
+                          </a:rPr>
+                          <m:t> </m:t>
+                        </m:r>
+                        <m:r>
+                          <a:rPr lang="en-US" sz="2000" i="1">
+                            <a:latin typeface="Cambria Math" panose="02040503050406030204" pitchFamily="18" charset="0"/>
+                          </a:rPr>
+                          <m:t>𝑑𝑒𝑡𝑒𝑐𝑡𝑒𝑑</m:t>
+                        </m:r>
+                        <m:r>
+                          <a:rPr lang="en-US" sz="2000" i="1">
+                            <a:latin typeface="Cambria Math" panose="02040503050406030204" pitchFamily="18" charset="0"/>
+                          </a:rPr>
+                          <m:t> </m:t>
+                        </m:r>
+                        <m:r>
+                          <a:rPr lang="en-US" sz="2000" i="1">
+                            <a:latin typeface="Cambria Math" panose="02040503050406030204" pitchFamily="18" charset="0"/>
+                          </a:rPr>
+                          <m:t>𝑎𝑠</m:t>
+                        </m:r>
+                        <m:r>
+                          <a:rPr lang="en-US" sz="2000" i="1">
+                            <a:latin typeface="Cambria Math" panose="02040503050406030204" pitchFamily="18" charset="0"/>
+                          </a:rPr>
+                          <m:t> </m:t>
+                        </m:r>
+                        <m:r>
+                          <a:rPr lang="en-US" sz="2000" i="1">
+                            <a:latin typeface="Cambria Math" panose="02040503050406030204" pitchFamily="18" charset="0"/>
+                          </a:rPr>
+                          <m:t>𝑎𝑏𝑛𝑜𝑟𝑚𝑎𝑙</m:t>
+                        </m:r>
+                        <m:r>
+                          <a:rPr lang="en-US" sz="2000" i="1">
+                            <a:latin typeface="Cambria Math" panose="02040503050406030204" pitchFamily="18" charset="0"/>
+                          </a:rPr>
+                          <m:t>)</m:t>
+                        </m:r>
+                      </m:num>
+                      <m:den>
+                        <m:r>
+                          <a:rPr lang="en-US" sz="2000" i="1">
+                            <a:latin typeface="Cambria Math" panose="02040503050406030204" pitchFamily="18" charset="0"/>
+                          </a:rPr>
+                          <m:t>#(</m:t>
+                        </m:r>
+                        <m:r>
+                          <a:rPr lang="en-US" sz="2000" i="1">
+                            <a:latin typeface="Cambria Math" panose="02040503050406030204" pitchFamily="18" charset="0"/>
+                          </a:rPr>
+                          <m:t>𝑝𝑟𝑒𝑑𝑖𝑐𝑡𝑖𝑜𝑛𝑠</m:t>
+                        </m:r>
+                        <m:r>
+                          <a:rPr lang="en-US" sz="2000" i="1">
+                            <a:latin typeface="Cambria Math" panose="02040503050406030204" pitchFamily="18" charset="0"/>
+                          </a:rPr>
+                          <m:t>)</m:t>
+                        </m:r>
+                      </m:den>
+                    </m:f>
+                  </m:oMath>
+                </a14:m>
+                <a:r>
+                  <a:rPr lang="en-US" sz="2000" dirty="0"/>
+                  <a:t>	     	                (1)</a:t>
+                </a:r>
+              </a:p>
+              <a:p>
+                <a:pPr lvl="0">
+                  <a:lnSpc>
+                    <a:spcPct val="114000"/>
+                  </a:lnSpc>
+                  <a:spcBef>
+                    <a:spcPts val="1000"/>
+                  </a:spcBef>
+                </a:pPr>
+                <a:r>
+                  <a:rPr lang="en-US" sz="2000" dirty="0"/>
+                  <a:t>From Eq. 1, the false alarm rate was 12.2%, and the expected value was at or below 20%, meaning the system does better than expected at predicting ‘normal.’</a:t>
+                </a:r>
+              </a:p>
+              <a:p>
+                <a:pPr algn="r">
+                  <a:lnSpc>
+                    <a:spcPct val="114000"/>
+                  </a:lnSpc>
+                </a:pPr>
+                <a14:m>
+                  <m:oMath xmlns:m="http://schemas.openxmlformats.org/officeDocument/2006/math">
+                    <m:f>
+                      <m:fPr>
+                        <m:ctrlPr>
+                          <a:rPr lang="en-US" sz="2000" i="1">
+                            <a:latin typeface="Cambria Math" panose="02040503050406030204" pitchFamily="18" charset="0"/>
+                          </a:rPr>
+                        </m:ctrlPr>
+                      </m:fPr>
+                      <m:num>
+                        <m:r>
+                          <a:rPr lang="en-US" sz="2000" i="1">
+                            <a:latin typeface="Cambria Math" panose="02040503050406030204" pitchFamily="18" charset="0"/>
+                          </a:rPr>
+                          <m:t>#(</m:t>
+                        </m:r>
+                        <m:r>
+                          <a:rPr lang="en-US" sz="2000" i="1">
+                            <a:latin typeface="Cambria Math" panose="02040503050406030204" pitchFamily="18" charset="0"/>
+                          </a:rPr>
+                          <m:t>𝑎𝑏𝑛𝑜𝑟𝑚𝑎𝑙</m:t>
+                        </m:r>
+                        <m:r>
+                          <a:rPr lang="en-US" sz="2000" i="1">
+                            <a:latin typeface="Cambria Math" panose="02040503050406030204" pitchFamily="18" charset="0"/>
+                          </a:rPr>
+                          <m:t> </m:t>
+                        </m:r>
+                        <m:r>
+                          <a:rPr lang="en-US" sz="2000" i="1">
+                            <a:latin typeface="Cambria Math" panose="02040503050406030204" pitchFamily="18" charset="0"/>
+                          </a:rPr>
+                          <m:t>𝑑𝑒𝑡𝑒𝑐𝑡𝑒𝑑</m:t>
+                        </m:r>
+                        <m:r>
+                          <a:rPr lang="en-US" sz="2000" i="1">
+                            <a:latin typeface="Cambria Math" panose="02040503050406030204" pitchFamily="18" charset="0"/>
+                          </a:rPr>
+                          <m:t> </m:t>
+                        </m:r>
+                        <m:r>
+                          <a:rPr lang="en-US" sz="2000" i="1">
+                            <a:latin typeface="Cambria Math" panose="02040503050406030204" pitchFamily="18" charset="0"/>
+                          </a:rPr>
+                          <m:t>𝑎𝑠</m:t>
+                        </m:r>
+                        <m:r>
+                          <a:rPr lang="en-US" sz="2000" i="1">
+                            <a:latin typeface="Cambria Math" panose="02040503050406030204" pitchFamily="18" charset="0"/>
+                          </a:rPr>
+                          <m:t> </m:t>
+                        </m:r>
+                        <m:r>
+                          <a:rPr lang="en-US" sz="2000" i="1">
+                            <a:latin typeface="Cambria Math" panose="02040503050406030204" pitchFamily="18" charset="0"/>
+                          </a:rPr>
+                          <m:t>𝑎𝑏𝑛𝑜𝑟𝑚𝑎𝑙</m:t>
+                        </m:r>
+                        <m:r>
+                          <a:rPr lang="en-US" sz="2000" i="1">
+                            <a:latin typeface="Cambria Math" panose="02040503050406030204" pitchFamily="18" charset="0"/>
+                          </a:rPr>
+                          <m:t>)</m:t>
+                        </m:r>
+                      </m:num>
+                      <m:den>
+                        <m:r>
+                          <a:rPr lang="en-US" sz="2000" i="1">
+                            <a:latin typeface="Cambria Math" panose="02040503050406030204" pitchFamily="18" charset="0"/>
+                          </a:rPr>
+                          <m:t>#(</m:t>
+                        </m:r>
+                        <m:r>
+                          <a:rPr lang="en-US" sz="2000" i="1">
+                            <a:latin typeface="Cambria Math" panose="02040503050406030204" pitchFamily="18" charset="0"/>
+                          </a:rPr>
+                          <m:t>𝑝𝑟𝑒𝑑𝑖𝑐𝑡𝑖𝑜𝑛𝑠</m:t>
+                        </m:r>
+                        <m:r>
+                          <a:rPr lang="en-US" sz="2000" i="1">
+                            <a:latin typeface="Cambria Math" panose="02040503050406030204" pitchFamily="18" charset="0"/>
+                          </a:rPr>
+                          <m:t>)</m:t>
+                        </m:r>
+                      </m:den>
+                    </m:f>
+                  </m:oMath>
+                </a14:m>
+                <a:r>
+                  <a:rPr lang="en-US" sz="2000" dirty="0"/>
+                  <a:t>	                              (2)</a:t>
+                </a:r>
+              </a:p>
+              <a:p>
+                <a:pPr lvl="0">
+                  <a:lnSpc>
+                    <a:spcPct val="114000"/>
+                  </a:lnSpc>
+                  <a:spcBef>
+                    <a:spcPts val="1000"/>
+                  </a:spcBef>
+                </a:pPr>
+                <a:r>
+                  <a:rPr lang="en-US" sz="2000" dirty="0"/>
+                  <a:t>From Eq. 2,  the anomaly detection rate was 62.9% out of an expected 70%.  This means that the system does not do as well as expected in detecting ‘abnormal.’ However, this may be because within abnormal movements such as falling to the ground, there are likely multiple ”normal” frames, such as when the person is standing up again.</a:t>
+                </a:r>
+              </a:p>
+              <a:p>
+                <a:pPr lvl="0">
+                  <a:lnSpc>
+                    <a:spcPct val="114000"/>
+                  </a:lnSpc>
+                  <a:spcBef>
+                    <a:spcPts val="1000"/>
+                  </a:spcBef>
+                </a:pPr>
+                <a:r>
+                  <a:rPr lang="en-US" sz="2000" dirty="0"/>
+                  <a:t>The system sends an alert at the first identification of ‘abnormal,’ and then keeps track of the next 30 frames, which is approximately 30 seconds.  If 10 of those are predicted as ‘abnormal’ then the system sends a follow-up alert.  The alerts can be sent in both an email and text format, which can be seen in Figures 1 and 2, respectively.  </a:t>
+                </a:r>
+              </a:p>
+              <a:p>
+                <a:endParaRPr lang="en-US" dirty="0"/>
+              </a:p>
+            </p:txBody>
+          </p:sp>
+        </mc:Choice>
+        <mc:Fallback>
+          <p:sp>
+            <p:nvSpPr>
+              <p:cNvPr id="7" name="TextBox 6">
+                <a:extLst>
+                  <a:ext uri="{FF2B5EF4-FFF2-40B4-BE49-F238E27FC236}">
+                    <a16:creationId xmlns:a16="http://schemas.microsoft.com/office/drawing/2014/main" id="{50AF90CF-B87C-E04E-AC30-4AE54C3B1BD9}"/>
+                  </a:ext>
+                </a:extLst>
+              </p:cNvPr>
+              <p:cNvSpPr txBox="1">
+                <a:spLocks noRot="1" noChangeAspect="1" noMove="1" noResize="1" noEditPoints="1" noAdjustHandles="1" noChangeArrowheads="1" noChangeShapeType="1" noTextEdit="1"/>
+              </p:cNvSpPr>
+              <p:nvPr/>
+            </p:nvSpPr>
+            <p:spPr>
+              <a:xfrm>
+                <a:off x="20946850" y="7518621"/>
+                <a:ext cx="9092654" cy="7571047"/>
+              </a:xfrm>
+              <a:prstGeom prst="rect">
+                <a:avLst/>
+              </a:prstGeom>
+              <a:blipFill>
+                <a:blip r:embed="rId11"/>
+                <a:stretch>
+                  <a:fillRect l="-976" t="-503" r="-976"/>
+                </a:stretch>
+              </a:blipFill>
+            </p:spPr>
+            <p:txBody>
+              <a:bodyPr/>
+              <a:lstStyle/>
+              <a:p>
+                <a:r>
+                  <a:rPr lang="en-US">
+                    <a:noFill/>
+                  </a:rPr>
+                  <a:t> </a:t>
+                </a:r>
+              </a:p>
+            </p:txBody>
+          </p:sp>
+        </mc:Fallback>
+      </mc:AlternateContent>
       <p:pic>
         <p:nvPicPr>
-          <p:cNvPr id="5" name="Picture 4">
+          <p:cNvPr id="10" name="Picture 9">
             <a:extLst>
               <a:ext uri="{FF2B5EF4-FFF2-40B4-BE49-F238E27FC236}">
-                <a16:creationId xmlns:a16="http://schemas.microsoft.com/office/drawing/2014/main" id="{7E42E094-5306-854F-B44D-D2C9256FAE2C}"/>
+                <a16:creationId xmlns:a16="http://schemas.microsoft.com/office/drawing/2014/main" id="{96B6EC58-613A-D648-B63E-7BFFC1E877CE}"/>
               </a:ext>
             </a:extLst>
           </p:cNvPr>
@@ -18836,15 +19158,15 @@
           <p:nvPr/>
         </p:nvPicPr>
         <p:blipFill>
-          <a:blip r:embed="rId11"/>
+          <a:blip r:embed="rId12"/>
           <a:stretch>
             <a:fillRect/>
           </a:stretch>
         </p:blipFill>
         <p:spPr>
           <a:xfrm>
-            <a:off x="26211750" y="4217724"/>
-            <a:ext cx="3365500" cy="3302000"/>
+            <a:off x="26718439" y="4313103"/>
+            <a:ext cx="2790175" cy="2689729"/>
           </a:xfrm>
           <a:prstGeom prst="rect">
             <a:avLst/>
@@ -18853,10 +19175,10 @@
       </p:pic>
       <p:sp>
         <p:nvSpPr>
-          <p:cNvPr id="7" name="TextBox 6">
+          <p:cNvPr id="11" name="TextBox 10">
             <a:extLst>
               <a:ext uri="{FF2B5EF4-FFF2-40B4-BE49-F238E27FC236}">
-                <a16:creationId xmlns:a16="http://schemas.microsoft.com/office/drawing/2014/main" id="{50AF90CF-B87C-E04E-AC30-4AE54C3B1BD9}"/>
+                <a16:creationId xmlns:a16="http://schemas.microsoft.com/office/drawing/2014/main" id="{DA32CB06-9D5C-6144-8535-E902A8F53382}"/>
               </a:ext>
             </a:extLst>
           </p:cNvPr>
@@ -18865,8 +19187,8 @@
         </p:nvSpPr>
         <p:spPr>
           <a:xfrm>
-            <a:off x="20970550" y="8807729"/>
-            <a:ext cx="8928203" cy="5845703"/>
+            <a:off x="6630580" y="8013756"/>
+            <a:ext cx="3106495" cy="307777"/>
           </a:xfrm>
           <a:prstGeom prst="rect">
             <a:avLst/>
@@ -18879,71 +19201,146 @@
           </a:bodyPr>
           <a:lstStyle/>
           <a:p>
-            <a:pPr lvl="0">
-              <a:spcBef>
-                <a:spcPts val="1350"/>
-              </a:spcBef>
+            <a:r>
+              <a:rPr lang="en-US" b="1" dirty="0"/>
+              <a:t>Figure 1:  Email alert for system</a:t>
+            </a:r>
+          </a:p>
+        </p:txBody>
+      </p:sp>
+      <p:sp>
+        <p:nvSpPr>
+          <p:cNvPr id="46" name="TextBox 45">
+            <a:extLst>
+              <a:ext uri="{FF2B5EF4-FFF2-40B4-BE49-F238E27FC236}">
+                <a16:creationId xmlns:a16="http://schemas.microsoft.com/office/drawing/2014/main" id="{B3FDCB4B-FF9F-1647-84C6-3CB583810BA3}"/>
+              </a:ext>
+            </a:extLst>
+          </p:cNvPr>
+          <p:cNvSpPr txBox="1"/>
+          <p:nvPr/>
+        </p:nvSpPr>
+        <p:spPr>
+          <a:xfrm>
+            <a:off x="6620751" y="10700037"/>
+            <a:ext cx="3106495" cy="307777"/>
+          </a:xfrm>
+          <a:prstGeom prst="rect">
+            <a:avLst/>
+          </a:prstGeom>
+          <a:noFill/>
+        </p:spPr>
+        <p:txBody>
+          <a:bodyPr wrap="square" rtlCol="0">
+            <a:spAutoFit/>
+          </a:bodyPr>
+          <a:lstStyle/>
+          <a:p>
+            <a:r>
+              <a:rPr lang="en-US" b="1" dirty="0"/>
+              <a:t>Figure 2: Text alert for system</a:t>
+            </a:r>
+          </a:p>
+        </p:txBody>
+      </p:sp>
+      <p:sp>
+        <p:nvSpPr>
+          <p:cNvPr id="47" name="Shape 95">
+            <a:extLst>
+              <a:ext uri="{FF2B5EF4-FFF2-40B4-BE49-F238E27FC236}">
+                <a16:creationId xmlns:a16="http://schemas.microsoft.com/office/drawing/2014/main" id="{DA7A7349-979F-DE4A-9687-811DA61D5BDA}"/>
+              </a:ext>
+            </a:extLst>
+          </p:cNvPr>
+          <p:cNvSpPr/>
+          <p:nvPr/>
+        </p:nvSpPr>
+        <p:spPr>
+          <a:xfrm>
+            <a:off x="20799350" y="20026670"/>
+            <a:ext cx="9362700" cy="614075"/>
+          </a:xfrm>
+          <a:prstGeom prst="rect">
+            <a:avLst/>
+          </a:prstGeom>
+          <a:solidFill>
+            <a:schemeClr val="lt1"/>
+          </a:solidFill>
+          <a:ln w="38100" cap="flat" cmpd="sng">
+            <a:solidFill>
+              <a:srgbClr val="78697B"/>
+            </a:solidFill>
+            <a:prstDash val="solid"/>
+            <a:miter lim="800000"/>
+            <a:headEnd type="none" w="sm" len="sm"/>
+            <a:tailEnd type="none" w="sm" len="sm"/>
+          </a:ln>
+        </p:spPr>
+        <p:txBody>
+          <a:bodyPr spcFirstLastPara="1" wrap="square" lIns="238925" tIns="62575" rIns="238925" bIns="238925" anchor="t" anchorCtr="0">
+            <a:noAutofit/>
+          </a:bodyPr>
+          <a:lstStyle/>
+          <a:p>
+            <a:pPr marL="0" marR="0" lvl="0" indent="0" algn="l" rtl="0">
+              <a:spcBef>
+                <a:spcPts val="200"/>
+              </a:spcBef>
+              <a:spcAft>
+                <a:spcPts val="200"/>
+              </a:spcAft>
+              <a:buNone/>
             </a:pPr>
             <a:r>
-              <a:rPr lang="en-US" sz="2400" b="1" dirty="0">
+              <a:rPr lang="en-US" sz="2000" b="1" dirty="0">
                 <a:solidFill>
                   <a:srgbClr val="1C4587"/>
                 </a:solidFill>
               </a:rPr>
-              <a:t>Results and Discussion</a:t>
-            </a:r>
-            <a:endParaRPr lang="en-US" sz="1600" dirty="0">
-              <a:solidFill>
-                <a:srgbClr val="1C4587"/>
-              </a:solidFill>
-            </a:endParaRPr>
-          </a:p>
-          <a:p>
-            <a:pPr lvl="0">
-              <a:lnSpc>
-                <a:spcPct val="114000"/>
-              </a:lnSpc>
-              <a:spcBef>
-                <a:spcPts val="1000"/>
-              </a:spcBef>
-            </a:pPr>
-            <a:r>
-              <a:rPr lang="en-US" sz="2000" dirty="0"/>
-              <a:t>After collecting the data in Figure 6, the false alarm detection rates and the anomaly detection rates were determined.  The false alarm was the total number of ‘</a:t>
-            </a:r>
-            <a:r>
-              <a:rPr lang="en-US" sz="2000" dirty="0" err="1"/>
-              <a:t>abnormals</a:t>
-            </a:r>
-            <a:r>
-              <a:rPr lang="en-US" sz="2000" dirty="0"/>
-              <a:t>’ seen in a trial of only expected normal, divided by the total number of predictions.  This gave a false alarm rate of 12.2%, and the expected value was at or below 20%, meaning the system does better than expected at predicting ‘normal.’</a:t>
+              <a:t>Acknowledgements</a:t>
             </a:r>
           </a:p>
           <a:p>
-            <a:pPr lvl="0">
-              <a:lnSpc>
-                <a:spcPct val="114000"/>
-              </a:lnSpc>
-              <a:spcBef>
-                <a:spcPts val="1000"/>
-              </a:spcBef>
-            </a:pPr>
             <a:r>
-              <a:rPr lang="en-US" sz="2000" dirty="0"/>
-              <a:t>The value for the anomaly detection rate was also determined by the number of ‘</a:t>
+              <a:rPr lang="en-US" sz="1000" dirty="0">
+                <a:solidFill>
+                  <a:schemeClr val="tx1"/>
+                </a:solidFill>
+              </a:rPr>
+              <a:t>We would like to thank Dr. Lei Huang, Dr. Gustavo </a:t>
             </a:r>
             <a:r>
-              <a:rPr lang="en-US" sz="2000" dirty="0" err="1"/>
-              <a:t>abnormals</a:t>
+              <a:rPr lang="en-US" sz="1000" dirty="0" err="1">
+                <a:solidFill>
+                  <a:schemeClr val="tx1"/>
+                </a:solidFill>
+              </a:rPr>
+              <a:t>Vejarano</a:t>
             </a:r>
             <a:r>
-              <a:rPr lang="en-US" sz="2000" dirty="0"/>
-              <a:t>’ predicted divided by the total number of predictions, but within a trial that was expected to be fully abnormal.  The result was an anomaly detection rate of 62.9% out of an expected 70%.  Numerically, this means that the system does not do as well as expected in detecting ‘abnormal.’ However, as many of the actions defined as normal took multiple frames to complete, some frames within the behavior appeared to be normal – such as the movement between falling and standing up again.  </a:t>
+              <a:rPr lang="en-US" sz="1000" dirty="0">
+                <a:solidFill>
+                  <a:schemeClr val="tx1"/>
+                </a:solidFill>
+              </a:rPr>
+              <a:t>, Dr. Hossein </a:t>
             </a:r>
-          </a:p>
-          <a:p>
-            <a:endParaRPr lang="en-US" dirty="0"/>
+            <a:r>
+              <a:rPr lang="en-US" sz="1000" dirty="0" err="1">
+                <a:solidFill>
+                  <a:schemeClr val="tx1"/>
+                </a:solidFill>
+              </a:rPr>
+              <a:t>Asghari</a:t>
+            </a:r>
+            <a:r>
+              <a:rPr lang="en-US" sz="1000" dirty="0">
+                <a:solidFill>
+                  <a:schemeClr val="tx1"/>
+                </a:solidFill>
+              </a:rPr>
+              <a:t>, and all the EECS faculty at LMU for their support with this project.  </a:t>
+            </a:r>
           </a:p>
         </p:txBody>
       </p:sp>

</xml_diff>